<commit_message>
minor changes in HTTP slide
</commit_message>
<xml_diff>
--- a/Atmoshere_and_websockets.pptx
+++ b/Atmoshere_and_websockets.pptx
@@ -5218,7 +5218,7 @@
         </p:nvSpPr>
         <p:spPr>
           <a:xfrm>
-            <a:off x="4343400" y="3886200"/>
+            <a:off x="4267200" y="3200400"/>
             <a:ext cx="1600200" cy="990600"/>
           </a:xfrm>
           <a:prstGeom prst="downArrow">
@@ -5262,7 +5262,7 @@
         </p:nvSpPr>
         <p:spPr>
           <a:xfrm>
-            <a:off x="2667000" y="3886200"/>
+            <a:off x="2590800" y="3200400"/>
             <a:ext cx="1600200" cy="990600"/>
           </a:xfrm>
           <a:prstGeom prst="downArrow">
@@ -5306,7 +5306,7 @@
         </p:nvSpPr>
         <p:spPr>
           <a:xfrm>
-            <a:off x="2895600" y="3124200"/>
+            <a:off x="2743200" y="4191000"/>
             <a:ext cx="4724400" cy="685800"/>
           </a:xfrm>
           <a:prstGeom prst="downArrow">
@@ -5350,7 +5350,7 @@
         </p:nvSpPr>
         <p:spPr>
           <a:xfrm>
-            <a:off x="6172200" y="3810000"/>
+            <a:off x="6096000" y="3124200"/>
             <a:ext cx="1524000" cy="1066800"/>
           </a:xfrm>
           <a:prstGeom prst="downArrow">

</xml_diff>

<commit_message>
added office temporary files to gitignore
</commit_message>
<xml_diff>
--- a/Atmoshere_and_websockets.pptx
+++ b/Atmoshere_and_websockets.pptx
@@ -3565,7 +3565,7 @@
           <a:p>
             <a:r>
               <a:rPr lang="lv-LV" dirty="0" smtClean="0"/>
-              <a:t>Gatis</a:t>
+              <a:t>Gatis Jansons</a:t>
             </a:r>
             <a:endParaRPr lang="en-US" dirty="0"/>
           </a:p>
@@ -4914,15 +4914,7 @@
           <a:p>
             <a:r>
               <a:rPr lang="en-US" dirty="0" smtClean="0"/>
-              <a:t>In a web-based game multiple users(players) can control objects(characters) on </a:t>
-            </a:r>
-            <a:r>
-              <a:rPr lang="en-US" dirty="0" smtClean="0"/>
-              <a:t>shared </a:t>
-            </a:r>
-            <a:r>
-              <a:rPr lang="en-US" dirty="0" smtClean="0"/>
-              <a:t>screen.</a:t>
+              <a:t>In a web-based game multiple users(players) can control objects(characters) on shared screen.</a:t>
             </a:r>
           </a:p>
           <a:p>
@@ -8530,6 +8522,10 @@
               <a:rPr lang="en-US" dirty="0" err="1" smtClean="0"/>
               <a:t>Gatis</a:t>
             </a:r>
+            <a:r>
+              <a:rPr lang="lv-LV" dirty="0" smtClean="0"/>
+              <a:t> Jansons</a:t>
+            </a:r>
             <a:endParaRPr lang="en-US" dirty="0"/>
           </a:p>
         </p:txBody>

</xml_diff>

<commit_message>
final thoughts on atmosphere
</commit_message>
<xml_diff>
--- a/Atmoshere_and_websockets.pptx
+++ b/Atmoshere_and_websockets.pptx
@@ -206,7 +206,7 @@
             <a:fld id="{8CC1716E-4D2C-40FE-8D90-F1D9B0432C97}" type="datetimeFigureOut">
               <a:rPr lang="en-US" smtClean="0"/>
               <a:pPr/>
-              <a:t>10/3/2012</a:t>
+              <a:t>10/8/2012</a:t>
             </a:fld>
             <a:endParaRPr lang="en-US"/>
           </a:p>
@@ -736,7 +736,7 @@
             <a:fld id="{1D8BD707-D9CF-40AE-B4C6-C98DA3205C09}" type="datetimeFigureOut">
               <a:rPr lang="en-US" smtClean="0"/>
               <a:pPr/>
-              <a:t>10/3/2012</a:t>
+              <a:t>10/8/2012</a:t>
             </a:fld>
             <a:endParaRPr lang="en-US"/>
           </a:p>
@@ -903,7 +903,7 @@
             <a:fld id="{1D8BD707-D9CF-40AE-B4C6-C98DA3205C09}" type="datetimeFigureOut">
               <a:rPr lang="en-US" smtClean="0"/>
               <a:pPr/>
-              <a:t>10/3/2012</a:t>
+              <a:t>10/8/2012</a:t>
             </a:fld>
             <a:endParaRPr lang="en-US"/>
           </a:p>
@@ -1080,7 +1080,7 @@
             <a:fld id="{1D8BD707-D9CF-40AE-B4C6-C98DA3205C09}" type="datetimeFigureOut">
               <a:rPr lang="en-US" smtClean="0"/>
               <a:pPr/>
-              <a:t>10/3/2012</a:t>
+              <a:t>10/8/2012</a:t>
             </a:fld>
             <a:endParaRPr lang="en-US"/>
           </a:p>
@@ -1247,7 +1247,7 @@
             <a:fld id="{1D8BD707-D9CF-40AE-B4C6-C98DA3205C09}" type="datetimeFigureOut">
               <a:rPr lang="en-US" smtClean="0"/>
               <a:pPr/>
-              <a:t>10/3/2012</a:t>
+              <a:t>10/8/2012</a:t>
             </a:fld>
             <a:endParaRPr lang="en-US"/>
           </a:p>
@@ -1490,7 +1490,7 @@
             <a:fld id="{1D8BD707-D9CF-40AE-B4C6-C98DA3205C09}" type="datetimeFigureOut">
               <a:rPr lang="en-US" smtClean="0"/>
               <a:pPr/>
-              <a:t>10/3/2012</a:t>
+              <a:t>10/8/2012</a:t>
             </a:fld>
             <a:endParaRPr lang="en-US"/>
           </a:p>
@@ -1775,7 +1775,7 @@
             <a:fld id="{1D8BD707-D9CF-40AE-B4C6-C98DA3205C09}" type="datetimeFigureOut">
               <a:rPr lang="en-US" smtClean="0"/>
               <a:pPr/>
-              <a:t>10/3/2012</a:t>
+              <a:t>10/8/2012</a:t>
             </a:fld>
             <a:endParaRPr lang="en-US"/>
           </a:p>
@@ -2194,7 +2194,7 @@
             <a:fld id="{1D8BD707-D9CF-40AE-B4C6-C98DA3205C09}" type="datetimeFigureOut">
               <a:rPr lang="en-US" smtClean="0"/>
               <a:pPr/>
-              <a:t>10/3/2012</a:t>
+              <a:t>10/8/2012</a:t>
             </a:fld>
             <a:endParaRPr lang="en-US"/>
           </a:p>
@@ -2309,7 +2309,7 @@
             <a:fld id="{1D8BD707-D9CF-40AE-B4C6-C98DA3205C09}" type="datetimeFigureOut">
               <a:rPr lang="en-US" smtClean="0"/>
               <a:pPr/>
-              <a:t>10/3/2012</a:t>
+              <a:t>10/8/2012</a:t>
             </a:fld>
             <a:endParaRPr lang="en-US"/>
           </a:p>
@@ -2401,7 +2401,7 @@
             <a:fld id="{1D8BD707-D9CF-40AE-B4C6-C98DA3205C09}" type="datetimeFigureOut">
               <a:rPr lang="en-US" smtClean="0"/>
               <a:pPr/>
-              <a:t>10/3/2012</a:t>
+              <a:t>10/8/2012</a:t>
             </a:fld>
             <a:endParaRPr lang="en-US"/>
           </a:p>
@@ -2675,7 +2675,7 @@
             <a:fld id="{1D8BD707-D9CF-40AE-B4C6-C98DA3205C09}" type="datetimeFigureOut">
               <a:rPr lang="en-US" smtClean="0"/>
               <a:pPr/>
-              <a:t>10/3/2012</a:t>
+              <a:t>10/8/2012</a:t>
             </a:fld>
             <a:endParaRPr lang="en-US"/>
           </a:p>
@@ -2925,7 +2925,7 @@
             <a:fld id="{1D8BD707-D9CF-40AE-B4C6-C98DA3205C09}" type="datetimeFigureOut">
               <a:rPr lang="en-US" smtClean="0"/>
               <a:pPr/>
-              <a:t>10/3/2012</a:t>
+              <a:t>10/8/2012</a:t>
             </a:fld>
             <a:endParaRPr lang="en-US"/>
           </a:p>
@@ -3135,7 +3135,7 @@
             <a:fld id="{1D8BD707-D9CF-40AE-B4C6-C98DA3205C09}" type="datetimeFigureOut">
               <a:rPr lang="en-US" smtClean="0"/>
               <a:pPr/>
-              <a:t>10/3/2012</a:t>
+              <a:t>10/8/2012</a:t>
             </a:fld>
             <a:endParaRPr lang="en-US"/>
           </a:p>
@@ -3647,8 +3647,13 @@
             </a:pPr>
             <a:r>
               <a:rPr lang="en-US" b="1" dirty="0" smtClean="0"/>
-              <a:t>Uses multiple technologies and does fallback</a:t>
-            </a:r>
+              <a:t>Uses multiple technologies and does </a:t>
+            </a:r>
+            <a:r>
+              <a:rPr lang="en-US" b="1" dirty="0" smtClean="0"/>
+              <a:t>fallback</a:t>
+            </a:r>
+            <a:endParaRPr lang="lv-LV" b="1" dirty="0" smtClean="0"/>
           </a:p>
           <a:p>
             <a:pPr>
@@ -3657,8 +3662,13 @@
             </a:pPr>
             <a:r>
               <a:rPr lang="en-US" dirty="0" smtClean="0"/>
-              <a:t>Open source (apache 2 license)</a:t>
-            </a:r>
+              <a:t>Has </a:t>
+            </a:r>
+            <a:r>
+              <a:rPr lang="en-US" dirty="0" err="1" smtClean="0"/>
+              <a:t>websockets</a:t>
+            </a:r>
+            <a:endParaRPr lang="en-US" dirty="0" smtClean="0"/>
           </a:p>
           <a:p>
             <a:pPr>
@@ -3667,6 +3677,16 @@
             </a:pPr>
             <a:r>
               <a:rPr lang="en-US" dirty="0" smtClean="0"/>
+              <a:t>Open source (apache 2 license)</a:t>
+            </a:r>
+          </a:p>
+          <a:p>
+            <a:pPr>
+              <a:buFont typeface="Calibri" pitchFamily="34" charset="0"/>
+              <a:buChar char="+"/>
+            </a:pPr>
+            <a:r>
+              <a:rPr lang="en-US" dirty="0" smtClean="0"/>
               <a:t>Simple maven dependency</a:t>
             </a:r>
             <a:endParaRPr lang="en-US" dirty="0"/>
@@ -3694,7 +3714,37 @@
             </a:pPr>
             <a:r>
               <a:rPr lang="en-US" dirty="0" smtClean="0"/>
-              <a:t>Not intended to get or post to ordinary web pages</a:t>
+              <a:t>Must use java </a:t>
+            </a:r>
+            <a:r>
+              <a:rPr lang="en-US" dirty="0" err="1" smtClean="0"/>
+              <a:t>servlets</a:t>
+            </a:r>
+            <a:r>
+              <a:rPr lang="en-US" dirty="0" smtClean="0"/>
+              <a:t> (cannot use static </a:t>
+            </a:r>
+            <a:r>
+              <a:rPr lang="en-US" dirty="0" err="1" smtClean="0"/>
+              <a:t>webpages</a:t>
+            </a:r>
+            <a:r>
+              <a:rPr lang="en-US" dirty="0" smtClean="0"/>
+              <a:t>)</a:t>
+            </a:r>
+          </a:p>
+          <a:p>
+            <a:pPr>
+              <a:buFont typeface="Calibri" pitchFamily="34" charset="0"/>
+              <a:buChar char="-"/>
+            </a:pPr>
+            <a:r>
+              <a:rPr lang="en-US" dirty="0" smtClean="0"/>
+              <a:t>All t</a:t>
+            </a:r>
+            <a:r>
+              <a:rPr lang="en-US" dirty="0" smtClean="0"/>
+              <a:t>utorials assume experience with maven</a:t>
             </a:r>
             <a:endParaRPr lang="en-US" dirty="0"/>
           </a:p>
@@ -3855,7 +3905,7 @@
                                 </p:cTn>
                               </p:par>
                               <p:par>
-                                <p:cTn id="14" presetID="10" presetClass="entr" presetSubtype="0" fill="hold" nodeType="withEffect">
+                                <p:cTn id="14" presetID="10" presetClass="entr" presetSubtype="0" fill="hold" grpId="0" nodeType="withEffect">
                                   <p:stCondLst>
                                     <p:cond delay="0"/>
                                   </p:stCondLst>
@@ -3863,6 +3913,49 @@
                                     <p:set>
                                       <p:cBhvr>
                                         <p:cTn id="15" dur="1" fill="hold">
+                                          <p:stCondLst>
+                                            <p:cond delay="0"/>
+                                          </p:stCondLst>
+                                        </p:cTn>
+                                        <p:tgtEl>
+                                          <p:spTgt spid="4">
+                                            <p:txEl>
+                                              <p:pRg st="3" end="3"/>
+                                            </p:txEl>
+                                          </p:spTgt>
+                                        </p:tgtEl>
+                                        <p:attrNameLst>
+                                          <p:attrName>style.visibility</p:attrName>
+                                        </p:attrNameLst>
+                                      </p:cBhvr>
+                                      <p:to>
+                                        <p:strVal val="visible"/>
+                                      </p:to>
+                                    </p:set>
+                                    <p:animEffect transition="in" filter="fade">
+                                      <p:cBhvr>
+                                        <p:cTn id="16" dur="2000"/>
+                                        <p:tgtEl>
+                                          <p:spTgt spid="4">
+                                            <p:txEl>
+                                              <p:pRg st="3" end="3"/>
+                                            </p:txEl>
+                                          </p:spTgt>
+                                        </p:tgtEl>
+                                      </p:cBhvr>
+                                    </p:animEffect>
+                                  </p:childTnLst>
+                                </p:cTn>
+                              </p:par>
+                              <p:par>
+                                <p:cTn id="17" presetID="10" presetClass="entr" presetSubtype="0" fill="hold" nodeType="withEffect">
+                                  <p:stCondLst>
+                                    <p:cond delay="0"/>
+                                  </p:stCondLst>
+                                  <p:childTnLst>
+                                    <p:set>
+                                      <p:cBhvr>
+                                        <p:cTn id="18" dur="1" fill="hold">
                                           <p:stCondLst>
                                             <p:cond delay="0"/>
                                           </p:stCondLst>
@@ -3884,11 +3977,54 @@
                                     </p:set>
                                     <p:animEffect transition="in" filter="fade">
                                       <p:cBhvr>
-                                        <p:cTn id="16" dur="2000"/>
+                                        <p:cTn id="19" dur="2000"/>
                                         <p:tgtEl>
                                           <p:spTgt spid="5">
                                             <p:txEl>
                                               <p:pRg st="0" end="0"/>
+                                            </p:txEl>
+                                          </p:spTgt>
+                                        </p:tgtEl>
+                                      </p:cBhvr>
+                                    </p:animEffect>
+                                  </p:childTnLst>
+                                </p:cTn>
+                              </p:par>
+                              <p:par>
+                                <p:cTn id="20" presetID="10" presetClass="entr" presetSubtype="0" fill="hold" nodeType="withEffect">
+                                  <p:stCondLst>
+                                    <p:cond delay="0"/>
+                                  </p:stCondLst>
+                                  <p:childTnLst>
+                                    <p:set>
+                                      <p:cBhvr>
+                                        <p:cTn id="21" dur="1" fill="hold">
+                                          <p:stCondLst>
+                                            <p:cond delay="0"/>
+                                          </p:stCondLst>
+                                        </p:cTn>
+                                        <p:tgtEl>
+                                          <p:spTgt spid="5">
+                                            <p:txEl>
+                                              <p:pRg st="1" end="1"/>
+                                            </p:txEl>
+                                          </p:spTgt>
+                                        </p:tgtEl>
+                                        <p:attrNameLst>
+                                          <p:attrName>style.visibility</p:attrName>
+                                        </p:attrNameLst>
+                                      </p:cBhvr>
+                                      <p:to>
+                                        <p:strVal val="visible"/>
+                                      </p:to>
+                                    </p:set>
+                                    <p:animEffect transition="in" filter="fade">
+                                      <p:cBhvr>
+                                        <p:cTn id="22" dur="2000"/>
+                                        <p:tgtEl>
+                                          <p:spTgt spid="5">
+                                            <p:txEl>
+                                              <p:pRg st="1" end="1"/>
                                             </p:txEl>
                                           </p:spTgt>
                                         </p:tgtEl>

</xml_diff>